<commit_message>
add materials for w3-d5
</commit_message>
<xml_diff>
--- a/week3/Day 4 - Inferring Causality with Observational Settings.pptx
+++ b/week3/Day 4 - Inferring Causality with Observational Settings.pptx
@@ -269,7 +269,7 @@
           <a:p>
             <a:fld id="{067B1726-BE77-4FE0-8F00-AC3F981F4023}" type="datetimeFigureOut">
               <a:rPr lang="en-US" smtClean="0"/>
-              <a:t>6/28/2017</a:t>
+              <a:t>6/29/2017</a:t>
             </a:fld>
             <a:endParaRPr lang="en-US"/>
           </a:p>
@@ -364,7 +364,6 @@
               <a:rPr lang="en-US"/>
               <a:t>Fifth level</a:t>
             </a:r>
-            <a:endParaRPr lang="en-US"/>
           </a:p>
         </p:txBody>
       </p:sp>
@@ -895,7 +894,7 @@
           <a:p>
             <a:fld id="{7B9550F6-6E4D-4242-985D-D9D61E420164}" type="datetimeFigureOut">
               <a:rPr lang="en-US" smtClean="0"/>
-              <a:t>6/28/2017</a:t>
+              <a:t>6/29/2017</a:t>
             </a:fld>
             <a:endParaRPr lang="en-US"/>
           </a:p>
@@ -1063,7 +1062,7 @@
           <a:p>
             <a:fld id="{7B9550F6-6E4D-4242-985D-D9D61E420164}" type="datetimeFigureOut">
               <a:rPr lang="en-US" smtClean="0"/>
-              <a:t>6/28/2017</a:t>
+              <a:t>6/29/2017</a:t>
             </a:fld>
             <a:endParaRPr lang="en-US"/>
           </a:p>
@@ -1241,7 +1240,7 @@
           <a:p>
             <a:fld id="{7B9550F6-6E4D-4242-985D-D9D61E420164}" type="datetimeFigureOut">
               <a:rPr lang="en-US" smtClean="0"/>
-              <a:t>6/28/2017</a:t>
+              <a:t>6/29/2017</a:t>
             </a:fld>
             <a:endParaRPr lang="en-US"/>
           </a:p>
@@ -1616,7 +1615,7 @@
           <a:p>
             <a:fld id="{7B9550F6-6E4D-4242-985D-D9D61E420164}" type="datetimeFigureOut">
               <a:rPr lang="en-US" smtClean="0"/>
-              <a:t>6/28/2017</a:t>
+              <a:t>6/29/2017</a:t>
             </a:fld>
             <a:endParaRPr lang="en-US"/>
           </a:p>
@@ -1861,7 +1860,7 @@
           <a:p>
             <a:fld id="{7B9550F6-6E4D-4242-985D-D9D61E420164}" type="datetimeFigureOut">
               <a:rPr lang="en-US" smtClean="0"/>
-              <a:t>6/28/2017</a:t>
+              <a:t>6/29/2017</a:t>
             </a:fld>
             <a:endParaRPr lang="en-US"/>
           </a:p>
@@ -2090,7 +2089,7 @@
           <a:p>
             <a:fld id="{7B9550F6-6E4D-4242-985D-D9D61E420164}" type="datetimeFigureOut">
               <a:rPr lang="en-US" smtClean="0"/>
-              <a:t>6/28/2017</a:t>
+              <a:t>6/29/2017</a:t>
             </a:fld>
             <a:endParaRPr lang="en-US"/>
           </a:p>
@@ -2454,7 +2453,7 @@
           <a:p>
             <a:fld id="{7B9550F6-6E4D-4242-985D-D9D61E420164}" type="datetimeFigureOut">
               <a:rPr lang="en-US" smtClean="0"/>
-              <a:t>6/28/2017</a:t>
+              <a:t>6/29/2017</a:t>
             </a:fld>
             <a:endParaRPr lang="en-US"/>
           </a:p>
@@ -2571,7 +2570,7 @@
           <a:p>
             <a:fld id="{7B9550F6-6E4D-4242-985D-D9D61E420164}" type="datetimeFigureOut">
               <a:rPr lang="en-US" smtClean="0"/>
-              <a:t>6/28/2017</a:t>
+              <a:t>6/29/2017</a:t>
             </a:fld>
             <a:endParaRPr lang="en-US"/>
           </a:p>
@@ -2666,7 +2665,7 @@
           <a:p>
             <a:fld id="{7B9550F6-6E4D-4242-985D-D9D61E420164}" type="datetimeFigureOut">
               <a:rPr lang="en-US" smtClean="0"/>
-              <a:t>6/28/2017</a:t>
+              <a:t>6/29/2017</a:t>
             </a:fld>
             <a:endParaRPr lang="en-US"/>
           </a:p>
@@ -2941,7 +2940,7 @@
           <a:p>
             <a:fld id="{7B9550F6-6E4D-4242-985D-D9D61E420164}" type="datetimeFigureOut">
               <a:rPr lang="en-US" smtClean="0"/>
-              <a:t>6/28/2017</a:t>
+              <a:t>6/29/2017</a:t>
             </a:fld>
             <a:endParaRPr lang="en-US"/>
           </a:p>
@@ -3193,7 +3192,7 @@
           <a:p>
             <a:fld id="{7B9550F6-6E4D-4242-985D-D9D61E420164}" type="datetimeFigureOut">
               <a:rPr lang="en-US" smtClean="0"/>
-              <a:t>6/28/2017</a:t>
+              <a:t>6/29/2017</a:t>
             </a:fld>
             <a:endParaRPr lang="en-US"/>
           </a:p>
@@ -3404,7 +3403,7 @@
           <a:p>
             <a:fld id="{7B9550F6-6E4D-4242-985D-D9D61E420164}" type="datetimeFigureOut">
               <a:rPr lang="en-US" smtClean="0"/>
-              <a:t>6/28/2017</a:t>
+              <a:t>6/29/2017</a:t>
             </a:fld>
             <a:endParaRPr lang="en-US"/>
           </a:p>
@@ -3823,21 +3822,19 @@
         <p:spPr/>
         <p:txBody>
           <a:bodyPr>
-            <a:normAutofit fontScale="90000"/>
+            <a:normAutofit/>
           </a:bodyPr>
           <a:lstStyle/>
           <a:p>
             <a:r>
               <a:rPr lang="en-US" dirty="0"/>
-              <a:t>Inferring Causality with Observational Data</a:t>
-            </a:r>
-            <a:br>
-              <a:rPr lang="en-US" dirty="0"/>
-            </a:br>
-            <a:r>
-              <a:rPr lang="en-US" dirty="0"/>
-              <a:t>(aka arguing about regressions)</a:t>
-            </a:r>
+              <a:t>Inferring Causality with </a:t>
+            </a:r>
+            <a:r>
+              <a:rPr lang="en-US"/>
+              <a:t>Observational Data</a:t>
+            </a:r>
+            <a:endParaRPr lang="en-US" dirty="0"/>
           </a:p>
         </p:txBody>
       </p:sp>
@@ -4078,12 +4075,11 @@
               <a:rPr lang="en-US" dirty="0"/>
               <a:t>The “Natural Experiment” Criteria</a:t>
             </a:r>
-            <a:endParaRPr lang="en-US" dirty="0"/>
           </a:p>
         </p:txBody>
       </p:sp>
-      <mc:AlternateContent xmlns:mc="http://schemas.openxmlformats.org/markup-compatibility/2006">
-        <mc:Choice xmlns:a14="http://schemas.microsoft.com/office/drawing/2010/main" Requires="a14">
+      <mc:AlternateContent xmlns:mc="http://schemas.openxmlformats.org/markup-compatibility/2006" xmlns:a14="http://schemas.microsoft.com/office/drawing/2010/main">
+        <mc:Choice Requires="a14">
           <p:sp>
             <p:nvSpPr>
               <p:cNvPr id="3" name="Content Placeholder 2"/>
@@ -4457,15 +4453,7 @@
                       <a:srgbClr val="00B050"/>
                     </a:solidFill>
                   </a:rPr>
-                  <a:t>“Natural Experiment” </a:t>
-                </a:r>
-                <a:r>
-                  <a:rPr lang="en-US" dirty="0">
-                    <a:solidFill>
-                      <a:srgbClr val="00B050"/>
-                    </a:solidFill>
-                  </a:rPr>
-                  <a:t>Criteria</a:t>
+                  <a:t>“Natural Experiment” Criteria</a:t>
                 </a:r>
                 <a:r>
                   <a:rPr lang="en-US" dirty="0"/>
@@ -4629,7 +4617,7 @@
             </p:txBody>
           </p:sp>
         </mc:Choice>
-        <mc:Fallback>
+        <mc:Fallback xmlns="">
           <p:sp>
             <p:nvSpPr>
               <p:cNvPr id="3" name="Content Placeholder 2"/>
@@ -4715,8 +4703,8 @@
           </a:p>
         </p:txBody>
       </p:sp>
-      <mc:AlternateContent xmlns:mc="http://schemas.openxmlformats.org/markup-compatibility/2006">
-        <mc:Choice xmlns:a14="http://schemas.microsoft.com/office/drawing/2010/main" Requires="a14">
+      <mc:AlternateContent xmlns:mc="http://schemas.openxmlformats.org/markup-compatibility/2006" xmlns:a14="http://schemas.microsoft.com/office/drawing/2010/main">
+        <mc:Choice Requires="a14">
           <p:sp>
             <p:nvSpPr>
               <p:cNvPr id="3" name="Content Placeholder 2"/>
@@ -5106,12 +5094,11 @@
                   <a:rPr lang="en-US" dirty="0"/>
                   <a:t>This strategy often reduces bias and makes things “better”, but rarely can you be certain it works perfectly. </a:t>
                 </a:r>
-                <a:endParaRPr lang="en-US" dirty="0"/>
               </a:p>
             </p:txBody>
           </p:sp>
         </mc:Choice>
-        <mc:Fallback>
+        <mc:Fallback xmlns="">
           <p:sp>
             <p:nvSpPr>
               <p:cNvPr id="3" name="Content Placeholder 2"/>
@@ -5197,8 +5184,8 @@
           </a:p>
         </p:txBody>
       </p:sp>
-      <mc:AlternateContent xmlns:mc="http://schemas.openxmlformats.org/markup-compatibility/2006">
-        <mc:Choice xmlns:a14="http://schemas.microsoft.com/office/drawing/2010/main" Requires="a14">
+      <mc:AlternateContent xmlns:mc="http://schemas.openxmlformats.org/markup-compatibility/2006" xmlns:a14="http://schemas.microsoft.com/office/drawing/2010/main">
+        <mc:Choice Requires="a14">
           <p:sp>
             <p:nvSpPr>
               <p:cNvPr id="3" name="Content Placeholder 2"/>
@@ -5727,7 +5714,7 @@
             </p:txBody>
           </p:sp>
         </mc:Choice>
-        <mc:Fallback>
+        <mc:Fallback xmlns="">
           <p:sp>
             <p:nvSpPr>
               <p:cNvPr id="3" name="Content Placeholder 2"/>
@@ -5853,8 +5840,8 @@
           </a:p>
         </p:txBody>
       </p:sp>
-      <mc:AlternateContent xmlns:mc="http://schemas.openxmlformats.org/markup-compatibility/2006">
-        <mc:Choice xmlns:a14="http://schemas.microsoft.com/office/drawing/2010/main" Requires="a14">
+      <mc:AlternateContent xmlns:mc="http://schemas.openxmlformats.org/markup-compatibility/2006" xmlns:a14="http://schemas.microsoft.com/office/drawing/2010/main">
+        <mc:Choice Requires="a14">
           <p:sp>
             <p:nvSpPr>
               <p:cNvPr id="3" name="Content Placeholder 2"/>
@@ -6375,7 +6362,7 @@
             </p:txBody>
           </p:sp>
         </mc:Choice>
-        <mc:Fallback>
+        <mc:Fallback xmlns="">
           <p:sp>
             <p:nvSpPr>
               <p:cNvPr id="3" name="Content Placeholder 2"/>
@@ -12200,8 +12187,8 @@
           </a:p>
         </p:txBody>
       </p:sp>
-      <mc:AlternateContent xmlns:mc="http://schemas.openxmlformats.org/markup-compatibility/2006">
-        <mc:Choice xmlns:a14="http://schemas.microsoft.com/office/drawing/2010/main" Requires="a14">
+      <mc:AlternateContent xmlns:mc="http://schemas.openxmlformats.org/markup-compatibility/2006" xmlns:a14="http://schemas.microsoft.com/office/drawing/2010/main">
+        <mc:Choice Requires="a14">
           <p:sp>
             <p:nvSpPr>
               <p:cNvPr id="3" name="TextBox 2"/>
@@ -12887,7 +12874,7 @@
             </p:txBody>
           </p:sp>
         </mc:Choice>
-        <mc:Fallback>
+        <mc:Fallback xmlns="">
           <p:sp>
             <p:nvSpPr>
               <p:cNvPr id="3" name="TextBox 2"/>
@@ -13088,8 +13075,8 @@
           </a:p>
         </p:txBody>
       </p:sp>
-      <mc:AlternateContent xmlns:mc="http://schemas.openxmlformats.org/markup-compatibility/2006">
-        <mc:Choice xmlns:a14="http://schemas.microsoft.com/office/drawing/2010/main" Requires="a14">
+      <mc:AlternateContent xmlns:mc="http://schemas.openxmlformats.org/markup-compatibility/2006" xmlns:a14="http://schemas.microsoft.com/office/drawing/2010/main">
+        <mc:Choice Requires="a14">
           <p:sp>
             <p:nvSpPr>
               <p:cNvPr id="4" name="Rectangle 3"/>
@@ -13275,7 +13262,7 @@
             </p:txBody>
           </p:sp>
         </mc:Choice>
-        <mc:Fallback>
+        <mc:Fallback xmlns="">
           <p:sp>
             <p:nvSpPr>
               <p:cNvPr id="4" name="Rectangle 3"/>
@@ -15018,8 +15005,8 @@
           <a:chExt cx="0" cy="0"/>
         </a:xfrm>
       </p:grpSpPr>
-      <mc:AlternateContent xmlns:mc="http://schemas.openxmlformats.org/markup-compatibility/2006">
-        <mc:Choice xmlns:a14="http://schemas.microsoft.com/office/drawing/2010/main" Requires="a14">
+      <mc:AlternateContent xmlns:mc="http://schemas.openxmlformats.org/markup-compatibility/2006" xmlns:a14="http://schemas.microsoft.com/office/drawing/2010/main">
+        <mc:Choice Requires="a14">
           <p:sp>
             <p:nvSpPr>
               <p:cNvPr id="4" name="Content Placeholder 2"/>
@@ -15500,7 +15487,7 @@
             </p:txBody>
           </p:sp>
         </mc:Choice>
-        <mc:Fallback>
+        <mc:Fallback xmlns="">
           <p:sp>
             <p:nvSpPr>
               <p:cNvPr id="4" name="Content Placeholder 2"/>
@@ -16264,8 +16251,8 @@
           <a:chExt cx="0" cy="0"/>
         </a:xfrm>
       </p:grpSpPr>
-      <mc:AlternateContent xmlns:mc="http://schemas.openxmlformats.org/markup-compatibility/2006">
-        <mc:Choice xmlns:a14="http://schemas.microsoft.com/office/drawing/2010/main" Requires="a14">
+      <mc:AlternateContent xmlns:mc="http://schemas.openxmlformats.org/markup-compatibility/2006" xmlns:a14="http://schemas.microsoft.com/office/drawing/2010/main">
+        <mc:Choice Requires="a14">
           <p:sp>
             <p:nvSpPr>
               <p:cNvPr id="4" name="Content Placeholder 2"/>
@@ -16750,7 +16737,7 @@
             </p:txBody>
           </p:sp>
         </mc:Choice>
-        <mc:Fallback>
+        <mc:Fallback xmlns="">
           <p:sp>
             <p:nvSpPr>
               <p:cNvPr id="4" name="Content Placeholder 2"/>
@@ -16819,8 +16806,8 @@
           <a:chExt cx="0" cy="0"/>
         </a:xfrm>
       </p:grpSpPr>
-      <mc:AlternateContent xmlns:mc="http://schemas.openxmlformats.org/markup-compatibility/2006">
-        <mc:Choice xmlns:a14="http://schemas.microsoft.com/office/drawing/2010/main" Requires="a14">
+      <mc:AlternateContent xmlns:mc="http://schemas.openxmlformats.org/markup-compatibility/2006" xmlns:a14="http://schemas.microsoft.com/office/drawing/2010/main">
+        <mc:Choice Requires="a14">
           <p:sp>
             <p:nvSpPr>
               <p:cNvPr id="4" name="Content Placeholder 2"/>
@@ -17317,7 +17304,7 @@
             </p:txBody>
           </p:sp>
         </mc:Choice>
-        <mc:Fallback>
+        <mc:Fallback xmlns="">
           <p:sp>
             <p:nvSpPr>
               <p:cNvPr id="4" name="Content Placeholder 2"/>
@@ -17386,8 +17373,8 @@
           <a:chExt cx="0" cy="0"/>
         </a:xfrm>
       </p:grpSpPr>
-      <mc:AlternateContent xmlns:mc="http://schemas.openxmlformats.org/markup-compatibility/2006">
-        <mc:Choice xmlns:a14="http://schemas.microsoft.com/office/drawing/2010/main" Requires="a14">
+      <mc:AlternateContent xmlns:mc="http://schemas.openxmlformats.org/markup-compatibility/2006" xmlns:a14="http://schemas.microsoft.com/office/drawing/2010/main">
+        <mc:Choice Requires="a14">
           <p:sp>
             <p:nvSpPr>
               <p:cNvPr id="4" name="Content Placeholder 2"/>
@@ -17872,7 +17859,7 @@
             </p:txBody>
           </p:sp>
         </mc:Choice>
-        <mc:Fallback>
+        <mc:Fallback xmlns="">
           <p:sp>
             <p:nvSpPr>
               <p:cNvPr id="4" name="Content Placeholder 2"/>
@@ -17941,8 +17928,8 @@
           <a:chExt cx="0" cy="0"/>
         </a:xfrm>
       </p:grpSpPr>
-      <mc:AlternateContent xmlns:mc="http://schemas.openxmlformats.org/markup-compatibility/2006">
-        <mc:Choice xmlns:a14="http://schemas.microsoft.com/office/drawing/2010/main" Requires="a14">
+      <mc:AlternateContent xmlns:mc="http://schemas.openxmlformats.org/markup-compatibility/2006" xmlns:a14="http://schemas.microsoft.com/office/drawing/2010/main">
+        <mc:Choice Requires="a14">
           <p:sp>
             <p:nvSpPr>
               <p:cNvPr id="4" name="Content Placeholder 2"/>
@@ -18433,7 +18420,7 @@
             </p:txBody>
           </p:sp>
         </mc:Choice>
-        <mc:Fallback>
+        <mc:Fallback xmlns="">
           <p:sp>
             <p:nvSpPr>
               <p:cNvPr id="4" name="Content Placeholder 2"/>

</xml_diff>